<commit_message>
progress on non-technical report
</commit_message>
<xml_diff>
--- a/images/good_bad_groups_diagram.pptx
+++ b/images/good_bad_groups_diagram.pptx
@@ -104,6 +104,11 @@
       </a:defRPr>
     </a:lvl9pPr>
   </p:defaultTextStyle>
+  <p:extLst>
+    <p:ext uri="{EFAFB233-063F-42B5-8137-9DF3F51BA10A}">
+      <p15:sldGuideLst xmlns:p15="http://schemas.microsoft.com/office/powerpoint/2012/main"/>
+    </p:ext>
+  </p:extLst>
 </p:presentation>
 </file>
 
@@ -112,12 +117,12 @@
   <pc:docChgLst>
     <pc:chgData name="Andrea Knox" userId="665513292f25d905" providerId="LiveId" clId="{9776059C-BFFD-441D-A58C-CB8C56AB5506}"/>
     <pc:docChg chg="undo redo custSel modSld">
-      <pc:chgData name="Andrea Knox" userId="665513292f25d905" providerId="LiveId" clId="{9776059C-BFFD-441D-A58C-CB8C56AB5506}" dt="2023-01-11T00:22:22.246" v="2640" actId="164"/>
+      <pc:chgData name="Andrea Knox" userId="665513292f25d905" providerId="LiveId" clId="{9776059C-BFFD-441D-A58C-CB8C56AB5506}" dt="2023-01-13T01:08:23.861" v="2649" actId="20577"/>
       <pc:docMkLst>
         <pc:docMk/>
       </pc:docMkLst>
       <pc:sldChg chg="addSp delSp modSp mod">
-        <pc:chgData name="Andrea Knox" userId="665513292f25d905" providerId="LiveId" clId="{9776059C-BFFD-441D-A58C-CB8C56AB5506}" dt="2023-01-11T00:22:22.246" v="2640" actId="164"/>
+        <pc:chgData name="Andrea Knox" userId="665513292f25d905" providerId="LiveId" clId="{9776059C-BFFD-441D-A58C-CB8C56AB5506}" dt="2023-01-13T01:08:23.861" v="2649" actId="20577"/>
         <pc:sldMkLst>
           <pc:docMk/>
           <pc:sldMk cId="792412512" sldId="256"/>
@@ -387,7 +392,7 @@
           </ac:spMkLst>
         </pc:spChg>
         <pc:spChg chg="add mod">
-          <ac:chgData name="Andrea Knox" userId="665513292f25d905" providerId="LiveId" clId="{9776059C-BFFD-441D-A58C-CB8C56AB5506}" dt="2023-01-11T00:22:22.246" v="2640" actId="164"/>
+          <ac:chgData name="Andrea Knox" userId="665513292f25d905" providerId="LiveId" clId="{9776059C-BFFD-441D-A58C-CB8C56AB5506}" dt="2023-01-13T01:08:20.669" v="2646" actId="20577"/>
           <ac:spMkLst>
             <pc:docMk/>
             <pc:sldMk cId="792412512" sldId="256"/>
@@ -539,7 +544,7 @@
           </ac:spMkLst>
         </pc:spChg>
         <pc:spChg chg="add mod">
-          <ac:chgData name="Andrea Knox" userId="665513292f25d905" providerId="LiveId" clId="{9776059C-BFFD-441D-A58C-CB8C56AB5506}" dt="2023-01-11T00:22:22.246" v="2640" actId="164"/>
+          <ac:chgData name="Andrea Knox" userId="665513292f25d905" providerId="LiveId" clId="{9776059C-BFFD-441D-A58C-CB8C56AB5506}" dt="2023-01-13T01:08:23.861" v="2649" actId="20577"/>
           <ac:spMkLst>
             <pc:docMk/>
             <pc:sldMk cId="792412512" sldId="256"/>
@@ -547,7 +552,7 @@
           </ac:spMkLst>
         </pc:spChg>
         <pc:spChg chg="add mod">
-          <ac:chgData name="Andrea Knox" userId="665513292f25d905" providerId="LiveId" clId="{9776059C-BFFD-441D-A58C-CB8C56AB5506}" dt="2023-01-11T00:22:22.246" v="2640" actId="164"/>
+          <ac:chgData name="Andrea Knox" userId="665513292f25d905" providerId="LiveId" clId="{9776059C-BFFD-441D-A58C-CB8C56AB5506}" dt="2023-01-13T01:08:17.005" v="2643" actId="20577"/>
           <ac:spMkLst>
             <pc:docMk/>
             <pc:sldMk cId="792412512" sldId="256"/>
@@ -845,7 +850,7 @@
           <a:p>
             <a:fld id="{8023FB20-6C77-4E09-B7B4-298AAFA95DAB}" type="datetimeFigureOut">
               <a:rPr lang="en-NZ" smtClean="0"/>
-              <a:t>11/01/2023</a:t>
+              <a:t>13/01/2023</a:t>
             </a:fld>
             <a:endParaRPr lang="en-NZ"/>
           </a:p>
@@ -1045,7 +1050,7 @@
           <a:p>
             <a:fld id="{8023FB20-6C77-4E09-B7B4-298AAFA95DAB}" type="datetimeFigureOut">
               <a:rPr lang="en-NZ" smtClean="0"/>
-              <a:t>11/01/2023</a:t>
+              <a:t>13/01/2023</a:t>
             </a:fld>
             <a:endParaRPr lang="en-NZ"/>
           </a:p>
@@ -1255,7 +1260,7 @@
           <a:p>
             <a:fld id="{8023FB20-6C77-4E09-B7B4-298AAFA95DAB}" type="datetimeFigureOut">
               <a:rPr lang="en-NZ" smtClean="0"/>
-              <a:t>11/01/2023</a:t>
+              <a:t>13/01/2023</a:t>
             </a:fld>
             <a:endParaRPr lang="en-NZ"/>
           </a:p>
@@ -1455,7 +1460,7 @@
           <a:p>
             <a:fld id="{8023FB20-6C77-4E09-B7B4-298AAFA95DAB}" type="datetimeFigureOut">
               <a:rPr lang="en-NZ" smtClean="0"/>
-              <a:t>11/01/2023</a:t>
+              <a:t>13/01/2023</a:t>
             </a:fld>
             <a:endParaRPr lang="en-NZ"/>
           </a:p>
@@ -1731,7 +1736,7 @@
           <a:p>
             <a:fld id="{8023FB20-6C77-4E09-B7B4-298AAFA95DAB}" type="datetimeFigureOut">
               <a:rPr lang="en-NZ" smtClean="0"/>
-              <a:t>11/01/2023</a:t>
+              <a:t>13/01/2023</a:t>
             </a:fld>
             <a:endParaRPr lang="en-NZ"/>
           </a:p>
@@ -1999,7 +2004,7 @@
           <a:p>
             <a:fld id="{8023FB20-6C77-4E09-B7B4-298AAFA95DAB}" type="datetimeFigureOut">
               <a:rPr lang="en-NZ" smtClean="0"/>
-              <a:t>11/01/2023</a:t>
+              <a:t>13/01/2023</a:t>
             </a:fld>
             <a:endParaRPr lang="en-NZ"/>
           </a:p>
@@ -2414,7 +2419,7 @@
           <a:p>
             <a:fld id="{8023FB20-6C77-4E09-B7B4-298AAFA95DAB}" type="datetimeFigureOut">
               <a:rPr lang="en-NZ" smtClean="0"/>
-              <a:t>11/01/2023</a:t>
+              <a:t>13/01/2023</a:t>
             </a:fld>
             <a:endParaRPr lang="en-NZ"/>
           </a:p>
@@ -2556,7 +2561,7 @@
           <a:p>
             <a:fld id="{8023FB20-6C77-4E09-B7B4-298AAFA95DAB}" type="datetimeFigureOut">
               <a:rPr lang="en-NZ" smtClean="0"/>
-              <a:t>11/01/2023</a:t>
+              <a:t>13/01/2023</a:t>
             </a:fld>
             <a:endParaRPr lang="en-NZ"/>
           </a:p>
@@ -2669,7 +2674,7 @@
           <a:p>
             <a:fld id="{8023FB20-6C77-4E09-B7B4-298AAFA95DAB}" type="datetimeFigureOut">
               <a:rPr lang="en-NZ" smtClean="0"/>
-              <a:t>11/01/2023</a:t>
+              <a:t>13/01/2023</a:t>
             </a:fld>
             <a:endParaRPr lang="en-NZ"/>
           </a:p>
@@ -2982,7 +2987,7 @@
           <a:p>
             <a:fld id="{8023FB20-6C77-4E09-B7B4-298AAFA95DAB}" type="datetimeFigureOut">
               <a:rPr lang="en-NZ" smtClean="0"/>
-              <a:t>11/01/2023</a:t>
+              <a:t>13/01/2023</a:t>
             </a:fld>
             <a:endParaRPr lang="en-NZ"/>
           </a:p>
@@ -3271,7 +3276,7 @@
           <a:p>
             <a:fld id="{8023FB20-6C77-4E09-B7B4-298AAFA95DAB}" type="datetimeFigureOut">
               <a:rPr lang="en-NZ" smtClean="0"/>
-              <a:t>11/01/2023</a:t>
+              <a:t>13/01/2023</a:t>
             </a:fld>
             <a:endParaRPr lang="en-NZ"/>
           </a:p>
@@ -3514,7 +3519,7 @@
           <a:p>
             <a:fld id="{8023FB20-6C77-4E09-B7B4-298AAFA95DAB}" type="datetimeFigureOut">
               <a:rPr lang="en-NZ" smtClean="0"/>
-              <a:t>11/01/2023</a:t>
+              <a:t>13/01/2023</a:t>
             </a:fld>
             <a:endParaRPr lang="en-NZ"/>
           </a:p>
@@ -5750,14 +5755,6 @@
             <a:p>
               <a:r>
                 <a:rPr lang="en-US" sz="1050" dirty="0"/>
-                <a:t>B</a:t>
-              </a:r>
-              <a:r>
-                <a:rPr lang="en-US" sz="1050" b="1" dirty="0"/>
-                <a:t>. </a:t>
-              </a:r>
-              <a:r>
-                <a:rPr lang="en-US" sz="1050" dirty="0"/>
                 <a:t>THESE ARE GOOD GROUPS</a:t>
               </a:r>
               <a:endParaRPr lang="en-NZ" sz="1050" dirty="0"/>
@@ -6653,8 +6650,12 @@
             <a:lstStyle/>
             <a:p>
               <a:r>
+                <a:rPr lang="en-US" sz="1050"/>
+                <a:t>THESE </a:t>
+              </a:r>
+              <a:r>
                 <a:rPr lang="en-US" sz="1050" dirty="0"/>
-                <a:t>C. THESE ARE NOT GOOD GROUPS</a:t>
+                <a:t>ARE NOT GOOD GROUPS</a:t>
               </a:r>
               <a:endParaRPr lang="en-NZ" sz="1050" dirty="0"/>
             </a:p>
@@ -6690,7 +6691,7 @@
             <a:p>
               <a:r>
                 <a:rPr lang="en-US" sz="1050" dirty="0"/>
-                <a:t>A. THIS IS THE DATA</a:t>
+                <a:t>THIS IS THE DATA</a:t>
               </a:r>
               <a:endParaRPr lang="en-NZ" sz="1050" dirty="0"/>
             </a:p>

</xml_diff>